<commit_message>
Training videos complete (draft). Ethics response.
</commit_message>
<xml_diff>
--- a/Material/Training/Slides/Self-Reporting.pptx
+++ b/Material/Training/Slides/Self-Reporting.pptx
@@ -9,6 +9,7 @@
     <p:sldId id="261" r:id="rId3"/>
     <p:sldId id="262" r:id="rId4"/>
     <p:sldId id="259" r:id="rId5"/>
+    <p:sldId id="263" r:id="rId6"/>
   </p:sldIdLst>
   <p:sldSz cx="12192000" cy="6858000"/>
   <p:notesSz cx="6858000" cy="9144000"/>
@@ -264,7 +265,7 @@
           <a:p>
             <a:fld id="{57111369-39DE-45D0-9AD2-D4BE600C35E0}" type="datetimeFigureOut">
               <a:rPr lang="en-CA" smtClean="0"/>
-              <a:t>2025-02-09</a:t>
+              <a:t>2025-02-20</a:t>
             </a:fld>
             <a:endParaRPr lang="en-CA"/>
           </a:p>
@@ -464,7 +465,7 @@
           <a:p>
             <a:fld id="{57111369-39DE-45D0-9AD2-D4BE600C35E0}" type="datetimeFigureOut">
               <a:rPr lang="en-CA" smtClean="0"/>
-              <a:t>2025-02-09</a:t>
+              <a:t>2025-02-20</a:t>
             </a:fld>
             <a:endParaRPr lang="en-CA"/>
           </a:p>
@@ -674,7 +675,7 @@
           <a:p>
             <a:fld id="{57111369-39DE-45D0-9AD2-D4BE600C35E0}" type="datetimeFigureOut">
               <a:rPr lang="en-CA" smtClean="0"/>
-              <a:t>2025-02-09</a:t>
+              <a:t>2025-02-20</a:t>
             </a:fld>
             <a:endParaRPr lang="en-CA"/>
           </a:p>
@@ -874,7 +875,7 @@
           <a:p>
             <a:fld id="{57111369-39DE-45D0-9AD2-D4BE600C35E0}" type="datetimeFigureOut">
               <a:rPr lang="en-CA" smtClean="0"/>
-              <a:t>2025-02-09</a:t>
+              <a:t>2025-02-20</a:t>
             </a:fld>
             <a:endParaRPr lang="en-CA"/>
           </a:p>
@@ -1150,7 +1151,7 @@
           <a:p>
             <a:fld id="{57111369-39DE-45D0-9AD2-D4BE600C35E0}" type="datetimeFigureOut">
               <a:rPr lang="en-CA" smtClean="0"/>
-              <a:t>2025-02-09</a:t>
+              <a:t>2025-02-20</a:t>
             </a:fld>
             <a:endParaRPr lang="en-CA"/>
           </a:p>
@@ -1418,7 +1419,7 @@
           <a:p>
             <a:fld id="{57111369-39DE-45D0-9AD2-D4BE600C35E0}" type="datetimeFigureOut">
               <a:rPr lang="en-CA" smtClean="0"/>
-              <a:t>2025-02-09</a:t>
+              <a:t>2025-02-20</a:t>
             </a:fld>
             <a:endParaRPr lang="en-CA"/>
           </a:p>
@@ -1833,7 +1834,7 @@
           <a:p>
             <a:fld id="{57111369-39DE-45D0-9AD2-D4BE600C35E0}" type="datetimeFigureOut">
               <a:rPr lang="en-CA" smtClean="0"/>
-              <a:t>2025-02-09</a:t>
+              <a:t>2025-02-20</a:t>
             </a:fld>
             <a:endParaRPr lang="en-CA"/>
           </a:p>
@@ -1975,7 +1976,7 @@
           <a:p>
             <a:fld id="{57111369-39DE-45D0-9AD2-D4BE600C35E0}" type="datetimeFigureOut">
               <a:rPr lang="en-CA" smtClean="0"/>
-              <a:t>2025-02-09</a:t>
+              <a:t>2025-02-20</a:t>
             </a:fld>
             <a:endParaRPr lang="en-CA"/>
           </a:p>
@@ -2088,7 +2089,7 @@
           <a:p>
             <a:fld id="{57111369-39DE-45D0-9AD2-D4BE600C35E0}" type="datetimeFigureOut">
               <a:rPr lang="en-CA" smtClean="0"/>
-              <a:t>2025-02-09</a:t>
+              <a:t>2025-02-20</a:t>
             </a:fld>
             <a:endParaRPr lang="en-CA"/>
           </a:p>
@@ -2401,7 +2402,7 @@
           <a:p>
             <a:fld id="{57111369-39DE-45D0-9AD2-D4BE600C35E0}" type="datetimeFigureOut">
               <a:rPr lang="en-CA" smtClean="0"/>
-              <a:t>2025-02-09</a:t>
+              <a:t>2025-02-20</a:t>
             </a:fld>
             <a:endParaRPr lang="en-CA"/>
           </a:p>
@@ -2690,7 +2691,7 @@
           <a:p>
             <a:fld id="{57111369-39DE-45D0-9AD2-D4BE600C35E0}" type="datetimeFigureOut">
               <a:rPr lang="en-CA" smtClean="0"/>
-              <a:t>2025-02-09</a:t>
+              <a:t>2025-02-20</a:t>
             </a:fld>
             <a:endParaRPr lang="en-CA"/>
           </a:p>
@@ -2933,7 +2934,7 @@
           <a:p>
             <a:fld id="{57111369-39DE-45D0-9AD2-D4BE600C35E0}" type="datetimeFigureOut">
               <a:rPr lang="en-CA" smtClean="0"/>
-              <a:t>2025-02-09</a:t>
+              <a:t>2025-02-20</a:t>
             </a:fld>
             <a:endParaRPr lang="en-CA"/>
           </a:p>
@@ -4197,7 +4198,7 @@
                 <a:ea typeface="Calibri" panose="020F0502020204030204" pitchFamily="34" charset="0"/>
                 <a:cs typeface="Times New Roman" panose="02020603050405020304" pitchFamily="18" charset="0"/>
               </a:rPr>
-              <a:t>You will perform the following tasks:</a:t>
+              <a:t>You will specifically perform the following tasks:</a:t>
             </a:r>
           </a:p>
           <a:p>
@@ -5979,7 +5980,7 @@
                 <a:ea typeface="Calibri" panose="020F0502020204030204" pitchFamily="34" charset="0"/>
                 <a:cs typeface="Times New Roman" panose="02020603050405020304" pitchFamily="18" charset="0"/>
               </a:rPr>
-              <a:t>Thank you for completing the main exercise(s). In the next two pages we will ask your opinion about the language and its concepts. In this page we are concerned with the </a:t>
+              <a:t>Thank you for completing the so far tasks. In the next two pages we will ask your opinion about the language and its concepts. In this page we are concerned with the </a:t>
             </a:r>
             <a:r>
               <a:rPr lang="en-US" sz="2400" b="1" dirty="0">
@@ -5997,7 +5998,21 @@
                 <a:ea typeface="Calibri" panose="020F0502020204030204" pitchFamily="34" charset="0"/>
                 <a:cs typeface="Times New Roman" panose="02020603050405020304" pitchFamily="18" charset="0"/>
               </a:rPr>
-              <a:t> of each concept or relationship. Specifically, based on the parts of the cases that you classified in the previous two screens, how relevant do you think each concept turned out to be for classifying those parts? </a:t>
+              <a:t> of each concept. </a:t>
+            </a:r>
+          </a:p>
+          <a:p>
+            <a:pPr marL="0" indent="0">
+              <a:buNone/>
+            </a:pPr>
+            <a:r>
+              <a:rPr lang="en-US" sz="2400" dirty="0">
+                <a:effectLst/>
+                <a:latin typeface="Calibri" panose="020F0502020204030204" pitchFamily="34" charset="0"/>
+                <a:ea typeface="Calibri" panose="020F0502020204030204" pitchFamily="34" charset="0"/>
+                <a:cs typeface="Times New Roman" panose="02020603050405020304" pitchFamily="18" charset="0"/>
+              </a:rPr>
+              <a:t>Specifically, consider the parts from the case or cases, that you were asked to classify in the previous task. These parts were words and phrases taken from the case descriptions that you were asked to classify under one or more concepts of the language. How relevant do you think each concept turned out to be for classifying those parts? Did you use all of them, or some of them were not relevant for describing any of the parts? Use the sliders to provide your assessment.</a:t>
             </a:r>
             <a:endParaRPr lang="en-CA" sz="2400" dirty="0">
               <a:effectLst/>
@@ -6817,7 +6832,7 @@
                 <a:ea typeface="Calibri" panose="020F0502020204030204" pitchFamily="34" charset="0"/>
                 <a:cs typeface="Times New Roman" panose="02020603050405020304" pitchFamily="18" charset="0"/>
               </a:rPr>
-              <a:t>We now ask you to reflect on the vocabulary with respect to its completeness. Do you think that the vocabulary contains all the concepts and relationships needed for classifying interesting facts about the case or cases that you studied? In other words, is the vocabulary </a:t>
+              <a:t>We now ask you to reflect on the vocabulary with respect to its completeness. Do you think that the vocabulary contains all the entities and relationships needed for classifying interesting facts about the case or cases that you studied? In other words, is the vocabulary </a:t>
             </a:r>
             <a:r>
               <a:rPr lang="en-US" sz="2400" b="1" dirty="0">
@@ -6835,7 +6850,7 @@
                 <a:ea typeface="Calibri" panose="020F0502020204030204" pitchFamily="34" charset="0"/>
                 <a:cs typeface="Times New Roman" panose="02020603050405020304" pitchFamily="18" charset="0"/>
               </a:rPr>
-              <a:t>? Or is it that more concepts or relationships need to be added to the vocabulary, in order to fully describe such cases?</a:t>
+              <a:t>? Or is it that more concepts (entities or relationships) need to be added to the vocabulary, in order to fully describe such cases?</a:t>
             </a:r>
             <a:endParaRPr lang="en-CA" sz="2400" dirty="0">
               <a:effectLst/>
@@ -6850,6 +6865,1126 @@
     <p:extLst>
       <p:ext uri="{BB962C8B-B14F-4D97-AF65-F5344CB8AC3E}">
         <p14:creationId xmlns:p14="http://schemas.microsoft.com/office/powerpoint/2010/main" val="2570578816"/>
+      </p:ext>
+    </p:extLst>
+  </p:cSld>
+  <p:clrMapOvr>
+    <a:masterClrMapping/>
+  </p:clrMapOvr>
+</p:sld>
+</file>
+
+<file path=ppt/slides/slide5.xml><?xml version="1.0" encoding="utf-8"?>
+<p:sld xmlns:a="http://schemas.openxmlformats.org/drawingml/2006/main" xmlns:r="http://schemas.openxmlformats.org/officeDocument/2006/relationships" xmlns:p="http://schemas.openxmlformats.org/presentationml/2006/main">
+  <p:cSld>
+    <p:bg>
+      <p:bgPr>
+        <a:solidFill>
+          <a:schemeClr val="bg1"/>
+        </a:solidFill>
+        <a:effectLst/>
+      </p:bgPr>
+    </p:bg>
+    <p:spTree>
+      <p:nvGrpSpPr>
+        <p:cNvPr id="1" name="">
+          <a:extLst>
+            <a:ext uri="{FF2B5EF4-FFF2-40B4-BE49-F238E27FC236}">
+              <a16:creationId xmlns:a16="http://schemas.microsoft.com/office/drawing/2014/main" id="{D061C127-4B24-F4AE-1851-FE6CAA867780}"/>
+            </a:ext>
+          </a:extLst>
+        </p:cNvPr>
+        <p:cNvGrpSpPr/>
+        <p:nvPr/>
+      </p:nvGrpSpPr>
+      <p:grpSpPr>
+        <a:xfrm>
+          <a:off x="0" y="0"/>
+          <a:ext cx="0" cy="0"/>
+          <a:chOff x="0" y="0"/>
+          <a:chExt cx="0" cy="0"/>
+        </a:xfrm>
+      </p:grpSpPr>
+      <p:sp useBgFill="1">
+        <p:nvSpPr>
+          <p:cNvPr id="10" name="Rectangle 9">
+            <a:extLst>
+              <a:ext uri="{FF2B5EF4-FFF2-40B4-BE49-F238E27FC236}">
+                <a16:creationId xmlns:a16="http://schemas.microsoft.com/office/drawing/2014/main" id="{9512F194-7313-80CF-5626-B2D527C25F43}"/>
+              </a:ext>
+              <a:ext uri="{C183D7F6-B498-43B3-948B-1728B52AA6E4}">
+                <adec:decorative xmlns:adec="http://schemas.microsoft.com/office/drawing/2017/decorative" val="1"/>
+              </a:ext>
+            </a:extLst>
+          </p:cNvPr>
+          <p:cNvSpPr>
+            <a:spLocks noGrp="1" noRot="1" noChangeAspect="1" noMove="1" noResize="1" noEditPoints="1" noAdjustHandles="1" noChangeArrowheads="1" noChangeShapeType="1" noTextEdit="1"/>
+          </p:cNvSpPr>
+          <p:nvPr>
+            <p:extLst>
+              <p:ext uri="{386F3935-93C4-4BCD-93E2-E3B085C9AB24}">
+                <p16:designElem xmlns:p16="http://schemas.microsoft.com/office/powerpoint/2015/main" val="1"/>
+              </p:ext>
+            </p:extLst>
+          </p:nvPr>
+        </p:nvSpPr>
+        <p:spPr>
+          <a:xfrm>
+            <a:off x="0" y="0"/>
+            <a:ext cx="12188952" cy="6858000"/>
+          </a:xfrm>
+          <a:prstGeom prst="rect">
+            <a:avLst/>
+          </a:prstGeom>
+          <a:ln>
+            <a:noFill/>
+          </a:ln>
+        </p:spPr>
+        <p:style>
+          <a:lnRef idx="2">
+            <a:schemeClr val="accent1">
+              <a:shade val="50000"/>
+            </a:schemeClr>
+          </a:lnRef>
+          <a:fillRef idx="1">
+            <a:schemeClr val="accent1"/>
+          </a:fillRef>
+          <a:effectRef idx="0">
+            <a:schemeClr val="accent1"/>
+          </a:effectRef>
+          <a:fontRef idx="minor">
+            <a:schemeClr val="lt1"/>
+          </a:fontRef>
+        </p:style>
+        <p:txBody>
+          <a:bodyPr rtlCol="0" anchor="ctr"/>
+          <a:lstStyle/>
+          <a:p>
+            <a:pPr algn="ctr"/>
+            <a:endParaRPr lang="en-US"/>
+          </a:p>
+        </p:txBody>
+      </p:sp>
+      <p:sp>
+        <p:nvSpPr>
+          <p:cNvPr id="4" name="Title 3">
+            <a:extLst>
+              <a:ext uri="{FF2B5EF4-FFF2-40B4-BE49-F238E27FC236}">
+                <a16:creationId xmlns:a16="http://schemas.microsoft.com/office/drawing/2014/main" id="{042A6022-5106-1497-6971-FAB1F96D76FB}"/>
+              </a:ext>
+            </a:extLst>
+          </p:cNvPr>
+          <p:cNvSpPr>
+            <a:spLocks noGrp="1"/>
+          </p:cNvSpPr>
+          <p:nvPr>
+            <p:ph type="title"/>
+          </p:nvPr>
+        </p:nvSpPr>
+        <p:spPr>
+          <a:xfrm>
+            <a:off x="838200" y="365125"/>
+            <a:ext cx="10515600" cy="1325563"/>
+          </a:xfrm>
+        </p:spPr>
+        <p:txBody>
+          <a:bodyPr>
+            <a:normAutofit/>
+          </a:bodyPr>
+          <a:lstStyle/>
+          <a:p>
+            <a:r>
+              <a:rPr lang="en-CA" sz="5400" dirty="0"/>
+              <a:t>Case: Temperature Controller</a:t>
+            </a:r>
+          </a:p>
+        </p:txBody>
+      </p:sp>
+      <p:sp>
+        <p:nvSpPr>
+          <p:cNvPr id="12" name="sketch line">
+            <a:extLst>
+              <a:ext uri="{FF2B5EF4-FFF2-40B4-BE49-F238E27FC236}">
+                <a16:creationId xmlns:a16="http://schemas.microsoft.com/office/drawing/2014/main" id="{5BD16E3C-C183-1B9A-4005-EF2A78E524DE}"/>
+              </a:ext>
+              <a:ext uri="{C183D7F6-B498-43B3-948B-1728B52AA6E4}">
+                <adec:decorative xmlns:adec="http://schemas.microsoft.com/office/drawing/2017/decorative" val="1"/>
+              </a:ext>
+            </a:extLst>
+          </p:cNvPr>
+          <p:cNvSpPr>
+            <a:spLocks noGrp="1" noRot="1" noChangeAspect="1" noMove="1" noResize="1" noEditPoints="1" noAdjustHandles="1" noChangeArrowheads="1" noChangeShapeType="1" noTextEdit="1"/>
+          </p:cNvSpPr>
+          <p:nvPr>
+            <p:extLst>
+              <p:ext uri="{386F3935-93C4-4BCD-93E2-E3B085C9AB24}">
+                <p16:designElem xmlns:p16="http://schemas.microsoft.com/office/powerpoint/2015/main" val="1"/>
+              </p:ext>
+            </p:extLst>
+          </p:nvPr>
+        </p:nvSpPr>
+        <p:spPr>
+          <a:xfrm>
+            <a:off x="669036" y="1677373"/>
+            <a:ext cx="10853928" cy="18288"/>
+          </a:xfrm>
+          <a:custGeom>
+            <a:avLst/>
+            <a:gdLst>
+              <a:gd name="connsiteX0" fmla="*/ 0 w 10853928"/>
+              <a:gd name="connsiteY0" fmla="*/ 0 h 18288"/>
+              <a:gd name="connsiteX1" fmla="*/ 461292 w 10853928"/>
+              <a:gd name="connsiteY1" fmla="*/ 0 h 18288"/>
+              <a:gd name="connsiteX2" fmla="*/ 1139662 w 10853928"/>
+              <a:gd name="connsiteY2" fmla="*/ 0 h 18288"/>
+              <a:gd name="connsiteX3" fmla="*/ 1926572 w 10853928"/>
+              <a:gd name="connsiteY3" fmla="*/ 0 h 18288"/>
+              <a:gd name="connsiteX4" fmla="*/ 2279325 w 10853928"/>
+              <a:gd name="connsiteY4" fmla="*/ 0 h 18288"/>
+              <a:gd name="connsiteX5" fmla="*/ 2632078 w 10853928"/>
+              <a:gd name="connsiteY5" fmla="*/ 0 h 18288"/>
+              <a:gd name="connsiteX6" fmla="*/ 3527527 w 10853928"/>
+              <a:gd name="connsiteY6" fmla="*/ 0 h 18288"/>
+              <a:gd name="connsiteX7" fmla="*/ 4205897 w 10853928"/>
+              <a:gd name="connsiteY7" fmla="*/ 0 h 18288"/>
+              <a:gd name="connsiteX8" fmla="*/ 4558650 w 10853928"/>
+              <a:gd name="connsiteY8" fmla="*/ 0 h 18288"/>
+              <a:gd name="connsiteX9" fmla="*/ 5237020 w 10853928"/>
+              <a:gd name="connsiteY9" fmla="*/ 0 h 18288"/>
+              <a:gd name="connsiteX10" fmla="*/ 6132469 w 10853928"/>
+              <a:gd name="connsiteY10" fmla="*/ 0 h 18288"/>
+              <a:gd name="connsiteX11" fmla="*/ 6702301 w 10853928"/>
+              <a:gd name="connsiteY11" fmla="*/ 0 h 18288"/>
+              <a:gd name="connsiteX12" fmla="*/ 7272132 w 10853928"/>
+              <a:gd name="connsiteY12" fmla="*/ 0 h 18288"/>
+              <a:gd name="connsiteX13" fmla="*/ 7950502 w 10853928"/>
+              <a:gd name="connsiteY13" fmla="*/ 0 h 18288"/>
+              <a:gd name="connsiteX14" fmla="*/ 8737412 w 10853928"/>
+              <a:gd name="connsiteY14" fmla="*/ 0 h 18288"/>
+              <a:gd name="connsiteX15" fmla="*/ 9524322 w 10853928"/>
+              <a:gd name="connsiteY15" fmla="*/ 0 h 18288"/>
+              <a:gd name="connsiteX16" fmla="*/ 10853928 w 10853928"/>
+              <a:gd name="connsiteY16" fmla="*/ 0 h 18288"/>
+              <a:gd name="connsiteX17" fmla="*/ 10853928 w 10853928"/>
+              <a:gd name="connsiteY17" fmla="*/ 18288 h 18288"/>
+              <a:gd name="connsiteX18" fmla="*/ 10392636 w 10853928"/>
+              <a:gd name="connsiteY18" fmla="*/ 18288 h 18288"/>
+              <a:gd name="connsiteX19" fmla="*/ 9497187 w 10853928"/>
+              <a:gd name="connsiteY19" fmla="*/ 18288 h 18288"/>
+              <a:gd name="connsiteX20" fmla="*/ 8818817 w 10853928"/>
+              <a:gd name="connsiteY20" fmla="*/ 18288 h 18288"/>
+              <a:gd name="connsiteX21" fmla="*/ 8466064 w 10853928"/>
+              <a:gd name="connsiteY21" fmla="*/ 18288 h 18288"/>
+              <a:gd name="connsiteX22" fmla="*/ 7787693 w 10853928"/>
+              <a:gd name="connsiteY22" fmla="*/ 18288 h 18288"/>
+              <a:gd name="connsiteX23" fmla="*/ 7217862 w 10853928"/>
+              <a:gd name="connsiteY23" fmla="*/ 18288 h 18288"/>
+              <a:gd name="connsiteX24" fmla="*/ 6648031 w 10853928"/>
+              <a:gd name="connsiteY24" fmla="*/ 18288 h 18288"/>
+              <a:gd name="connsiteX25" fmla="*/ 6078200 w 10853928"/>
+              <a:gd name="connsiteY25" fmla="*/ 18288 h 18288"/>
+              <a:gd name="connsiteX26" fmla="*/ 5508368 w 10853928"/>
+              <a:gd name="connsiteY26" fmla="*/ 18288 h 18288"/>
+              <a:gd name="connsiteX27" fmla="*/ 4721459 w 10853928"/>
+              <a:gd name="connsiteY27" fmla="*/ 18288 h 18288"/>
+              <a:gd name="connsiteX28" fmla="*/ 4043088 w 10853928"/>
+              <a:gd name="connsiteY28" fmla="*/ 18288 h 18288"/>
+              <a:gd name="connsiteX29" fmla="*/ 3690336 w 10853928"/>
+              <a:gd name="connsiteY29" fmla="*/ 18288 h 18288"/>
+              <a:gd name="connsiteX30" fmla="*/ 3120504 w 10853928"/>
+              <a:gd name="connsiteY30" fmla="*/ 18288 h 18288"/>
+              <a:gd name="connsiteX31" fmla="*/ 2333595 w 10853928"/>
+              <a:gd name="connsiteY31" fmla="*/ 18288 h 18288"/>
+              <a:gd name="connsiteX32" fmla="*/ 1872303 w 10853928"/>
+              <a:gd name="connsiteY32" fmla="*/ 18288 h 18288"/>
+              <a:gd name="connsiteX33" fmla="*/ 976854 w 10853928"/>
+              <a:gd name="connsiteY33" fmla="*/ 18288 h 18288"/>
+              <a:gd name="connsiteX34" fmla="*/ 0 w 10853928"/>
+              <a:gd name="connsiteY34" fmla="*/ 18288 h 18288"/>
+              <a:gd name="connsiteX35" fmla="*/ 0 w 10853928"/>
+              <a:gd name="connsiteY35" fmla="*/ 0 h 18288"/>
+            </a:gdLst>
+            <a:ahLst/>
+            <a:cxnLst>
+              <a:cxn ang="0">
+                <a:pos x="connsiteX0" y="connsiteY0"/>
+              </a:cxn>
+              <a:cxn ang="0">
+                <a:pos x="connsiteX1" y="connsiteY1"/>
+              </a:cxn>
+              <a:cxn ang="0">
+                <a:pos x="connsiteX2" y="connsiteY2"/>
+              </a:cxn>
+              <a:cxn ang="0">
+                <a:pos x="connsiteX3" y="connsiteY3"/>
+              </a:cxn>
+              <a:cxn ang="0">
+                <a:pos x="connsiteX4" y="connsiteY4"/>
+              </a:cxn>
+              <a:cxn ang="0">
+                <a:pos x="connsiteX5" y="connsiteY5"/>
+              </a:cxn>
+              <a:cxn ang="0">
+                <a:pos x="connsiteX6" y="connsiteY6"/>
+              </a:cxn>
+              <a:cxn ang="0">
+                <a:pos x="connsiteX7" y="connsiteY7"/>
+              </a:cxn>
+              <a:cxn ang="0">
+                <a:pos x="connsiteX8" y="connsiteY8"/>
+              </a:cxn>
+              <a:cxn ang="0">
+                <a:pos x="connsiteX9" y="connsiteY9"/>
+              </a:cxn>
+              <a:cxn ang="0">
+                <a:pos x="connsiteX10" y="connsiteY10"/>
+              </a:cxn>
+              <a:cxn ang="0">
+                <a:pos x="connsiteX11" y="connsiteY11"/>
+              </a:cxn>
+              <a:cxn ang="0">
+                <a:pos x="connsiteX12" y="connsiteY12"/>
+              </a:cxn>
+              <a:cxn ang="0">
+                <a:pos x="connsiteX13" y="connsiteY13"/>
+              </a:cxn>
+              <a:cxn ang="0">
+                <a:pos x="connsiteX14" y="connsiteY14"/>
+              </a:cxn>
+              <a:cxn ang="0">
+                <a:pos x="connsiteX15" y="connsiteY15"/>
+              </a:cxn>
+              <a:cxn ang="0">
+                <a:pos x="connsiteX16" y="connsiteY16"/>
+              </a:cxn>
+              <a:cxn ang="0">
+                <a:pos x="connsiteX17" y="connsiteY17"/>
+              </a:cxn>
+              <a:cxn ang="0">
+                <a:pos x="connsiteX18" y="connsiteY18"/>
+              </a:cxn>
+              <a:cxn ang="0">
+                <a:pos x="connsiteX19" y="connsiteY19"/>
+              </a:cxn>
+              <a:cxn ang="0">
+                <a:pos x="connsiteX20" y="connsiteY20"/>
+              </a:cxn>
+              <a:cxn ang="0">
+                <a:pos x="connsiteX21" y="connsiteY21"/>
+              </a:cxn>
+              <a:cxn ang="0">
+                <a:pos x="connsiteX22" y="connsiteY22"/>
+              </a:cxn>
+              <a:cxn ang="0">
+                <a:pos x="connsiteX23" y="connsiteY23"/>
+              </a:cxn>
+              <a:cxn ang="0">
+                <a:pos x="connsiteX24" y="connsiteY24"/>
+              </a:cxn>
+              <a:cxn ang="0">
+                <a:pos x="connsiteX25" y="connsiteY25"/>
+              </a:cxn>
+              <a:cxn ang="0">
+                <a:pos x="connsiteX26" y="connsiteY26"/>
+              </a:cxn>
+              <a:cxn ang="0">
+                <a:pos x="connsiteX27" y="connsiteY27"/>
+              </a:cxn>
+              <a:cxn ang="0">
+                <a:pos x="connsiteX28" y="connsiteY28"/>
+              </a:cxn>
+              <a:cxn ang="0">
+                <a:pos x="connsiteX29" y="connsiteY29"/>
+              </a:cxn>
+              <a:cxn ang="0">
+                <a:pos x="connsiteX30" y="connsiteY30"/>
+              </a:cxn>
+              <a:cxn ang="0">
+                <a:pos x="connsiteX31" y="connsiteY31"/>
+              </a:cxn>
+              <a:cxn ang="0">
+                <a:pos x="connsiteX32" y="connsiteY32"/>
+              </a:cxn>
+              <a:cxn ang="0">
+                <a:pos x="connsiteX33" y="connsiteY33"/>
+              </a:cxn>
+              <a:cxn ang="0">
+                <a:pos x="connsiteX34" y="connsiteY34"/>
+              </a:cxn>
+              <a:cxn ang="0">
+                <a:pos x="connsiteX35" y="connsiteY35"/>
+              </a:cxn>
+            </a:cxnLst>
+            <a:rect l="l" t="t" r="r" b="b"/>
+            <a:pathLst>
+              <a:path w="10853928" h="18288" fill="none" extrusionOk="0">
+                <a:moveTo>
+                  <a:pt x="0" y="0"/>
+                </a:moveTo>
+                <a:cubicBezTo>
+                  <a:pt x="146993" y="-19076"/>
+                  <a:pt x="347684" y="-4790"/>
+                  <a:pt x="461292" y="0"/>
+                </a:cubicBezTo>
+                <a:cubicBezTo>
+                  <a:pt x="574900" y="4790"/>
+                  <a:pt x="808367" y="19821"/>
+                  <a:pt x="1139662" y="0"/>
+                </a:cubicBezTo>
+                <a:cubicBezTo>
+                  <a:pt x="1470957" y="-19821"/>
+                  <a:pt x="1627405" y="5721"/>
+                  <a:pt x="1926572" y="0"/>
+                </a:cubicBezTo>
+                <a:cubicBezTo>
+                  <a:pt x="2225739" y="-5721"/>
+                  <a:pt x="2137730" y="-3235"/>
+                  <a:pt x="2279325" y="0"/>
+                </a:cubicBezTo>
+                <a:cubicBezTo>
+                  <a:pt x="2420920" y="3235"/>
+                  <a:pt x="2456518" y="9685"/>
+                  <a:pt x="2632078" y="0"/>
+                </a:cubicBezTo>
+                <a:cubicBezTo>
+                  <a:pt x="2807638" y="-9685"/>
+                  <a:pt x="3211516" y="-43007"/>
+                  <a:pt x="3527527" y="0"/>
+                </a:cubicBezTo>
+                <a:cubicBezTo>
+                  <a:pt x="3843538" y="43007"/>
+                  <a:pt x="4058833" y="22042"/>
+                  <a:pt x="4205897" y="0"/>
+                </a:cubicBezTo>
+                <a:cubicBezTo>
+                  <a:pt x="4352961" y="-22042"/>
+                  <a:pt x="4474805" y="-11846"/>
+                  <a:pt x="4558650" y="0"/>
+                </a:cubicBezTo>
+                <a:cubicBezTo>
+                  <a:pt x="4642495" y="11846"/>
+                  <a:pt x="5041928" y="-6069"/>
+                  <a:pt x="5237020" y="0"/>
+                </a:cubicBezTo>
+                <a:cubicBezTo>
+                  <a:pt x="5432112" y="6069"/>
+                  <a:pt x="5943266" y="-17479"/>
+                  <a:pt x="6132469" y="0"/>
+                </a:cubicBezTo>
+                <a:cubicBezTo>
+                  <a:pt x="6321672" y="17479"/>
+                  <a:pt x="6483872" y="26234"/>
+                  <a:pt x="6702301" y="0"/>
+                </a:cubicBezTo>
+                <a:cubicBezTo>
+                  <a:pt x="6920730" y="-26234"/>
+                  <a:pt x="6991194" y="-15156"/>
+                  <a:pt x="7272132" y="0"/>
+                </a:cubicBezTo>
+                <a:cubicBezTo>
+                  <a:pt x="7553070" y="15156"/>
+                  <a:pt x="7684444" y="-32961"/>
+                  <a:pt x="7950502" y="0"/>
+                </a:cubicBezTo>
+                <a:cubicBezTo>
+                  <a:pt x="8216560" y="32961"/>
+                  <a:pt x="8493290" y="-10491"/>
+                  <a:pt x="8737412" y="0"/>
+                </a:cubicBezTo>
+                <a:cubicBezTo>
+                  <a:pt x="8981534" y="10491"/>
+                  <a:pt x="9191586" y="-13899"/>
+                  <a:pt x="9524322" y="0"/>
+                </a:cubicBezTo>
+                <a:cubicBezTo>
+                  <a:pt x="9857058" y="13899"/>
+                  <a:pt x="10297509" y="7485"/>
+                  <a:pt x="10853928" y="0"/>
+                </a:cubicBezTo>
+                <a:cubicBezTo>
+                  <a:pt x="10854574" y="4451"/>
+                  <a:pt x="10854418" y="9226"/>
+                  <a:pt x="10853928" y="18288"/>
+                </a:cubicBezTo>
+                <a:cubicBezTo>
+                  <a:pt x="10691638" y="28522"/>
+                  <a:pt x="10574319" y="29578"/>
+                  <a:pt x="10392636" y="18288"/>
+                </a:cubicBezTo>
+                <a:cubicBezTo>
+                  <a:pt x="10210953" y="6998"/>
+                  <a:pt x="9836277" y="-16742"/>
+                  <a:pt x="9497187" y="18288"/>
+                </a:cubicBezTo>
+                <a:cubicBezTo>
+                  <a:pt x="9158097" y="53318"/>
+                  <a:pt x="9119479" y="30714"/>
+                  <a:pt x="8818817" y="18288"/>
+                </a:cubicBezTo>
+                <a:cubicBezTo>
+                  <a:pt x="8518155" y="5863"/>
+                  <a:pt x="8640037" y="6483"/>
+                  <a:pt x="8466064" y="18288"/>
+                </a:cubicBezTo>
+                <a:cubicBezTo>
+                  <a:pt x="8292091" y="30093"/>
+                  <a:pt x="7997656" y="18914"/>
+                  <a:pt x="7787693" y="18288"/>
+                </a:cubicBezTo>
+                <a:cubicBezTo>
+                  <a:pt x="7577730" y="17662"/>
+                  <a:pt x="7412468" y="21416"/>
+                  <a:pt x="7217862" y="18288"/>
+                </a:cubicBezTo>
+                <a:cubicBezTo>
+                  <a:pt x="7023256" y="15160"/>
+                  <a:pt x="6898018" y="14824"/>
+                  <a:pt x="6648031" y="18288"/>
+                </a:cubicBezTo>
+                <a:cubicBezTo>
+                  <a:pt x="6398044" y="21752"/>
+                  <a:pt x="6254402" y="38625"/>
+                  <a:pt x="6078200" y="18288"/>
+                </a:cubicBezTo>
+                <a:cubicBezTo>
+                  <a:pt x="5901998" y="-2049"/>
+                  <a:pt x="5622886" y="3213"/>
+                  <a:pt x="5508368" y="18288"/>
+                </a:cubicBezTo>
+                <a:cubicBezTo>
+                  <a:pt x="5393850" y="33363"/>
+                  <a:pt x="5036260" y="26830"/>
+                  <a:pt x="4721459" y="18288"/>
+                </a:cubicBezTo>
+                <a:cubicBezTo>
+                  <a:pt x="4406658" y="9746"/>
+                  <a:pt x="4239221" y="41551"/>
+                  <a:pt x="4043088" y="18288"/>
+                </a:cubicBezTo>
+                <a:cubicBezTo>
+                  <a:pt x="3846955" y="-4975"/>
+                  <a:pt x="3818802" y="34658"/>
+                  <a:pt x="3690336" y="18288"/>
+                </a:cubicBezTo>
+                <a:cubicBezTo>
+                  <a:pt x="3561870" y="1918"/>
+                  <a:pt x="3265491" y="42194"/>
+                  <a:pt x="3120504" y="18288"/>
+                </a:cubicBezTo>
+                <a:cubicBezTo>
+                  <a:pt x="2975517" y="-5618"/>
+                  <a:pt x="2720254" y="36673"/>
+                  <a:pt x="2333595" y="18288"/>
+                </a:cubicBezTo>
+                <a:cubicBezTo>
+                  <a:pt x="1946936" y="-97"/>
+                  <a:pt x="2097241" y="5776"/>
+                  <a:pt x="1872303" y="18288"/>
+                </a:cubicBezTo>
+                <a:cubicBezTo>
+                  <a:pt x="1647365" y="30800"/>
+                  <a:pt x="1282708" y="45380"/>
+                  <a:pt x="976854" y="18288"/>
+                </a:cubicBezTo>
+                <a:cubicBezTo>
+                  <a:pt x="671000" y="-8804"/>
+                  <a:pt x="408401" y="-12775"/>
+                  <a:pt x="0" y="18288"/>
+                </a:cubicBezTo>
+                <a:cubicBezTo>
+                  <a:pt x="-213" y="9468"/>
+                  <a:pt x="187" y="4459"/>
+                  <a:pt x="0" y="0"/>
+                </a:cubicBezTo>
+                <a:close/>
+              </a:path>
+              <a:path w="10853928" h="18288" stroke="0" extrusionOk="0">
+                <a:moveTo>
+                  <a:pt x="0" y="0"/>
+                </a:moveTo>
+                <a:cubicBezTo>
+                  <a:pt x="267322" y="15284"/>
+                  <a:pt x="415388" y="-21048"/>
+                  <a:pt x="569831" y="0"/>
+                </a:cubicBezTo>
+                <a:cubicBezTo>
+                  <a:pt x="724274" y="21048"/>
+                  <a:pt x="769333" y="-2353"/>
+                  <a:pt x="922584" y="0"/>
+                </a:cubicBezTo>
+                <a:cubicBezTo>
+                  <a:pt x="1075835" y="2353"/>
+                  <a:pt x="1399490" y="-145"/>
+                  <a:pt x="1818033" y="0"/>
+                </a:cubicBezTo>
+                <a:cubicBezTo>
+                  <a:pt x="2236576" y="145"/>
+                  <a:pt x="2145330" y="5482"/>
+                  <a:pt x="2387864" y="0"/>
+                </a:cubicBezTo>
+                <a:cubicBezTo>
+                  <a:pt x="2630398" y="-5482"/>
+                  <a:pt x="2793207" y="18487"/>
+                  <a:pt x="2957695" y="0"/>
+                </a:cubicBezTo>
+                <a:cubicBezTo>
+                  <a:pt x="3122183" y="-18487"/>
+                  <a:pt x="3579141" y="19003"/>
+                  <a:pt x="3853144" y="0"/>
+                </a:cubicBezTo>
+                <a:cubicBezTo>
+                  <a:pt x="4127147" y="-19003"/>
+                  <a:pt x="4209857" y="12211"/>
+                  <a:pt x="4314436" y="0"/>
+                </a:cubicBezTo>
+                <a:cubicBezTo>
+                  <a:pt x="4419015" y="-12211"/>
+                  <a:pt x="4762459" y="-17220"/>
+                  <a:pt x="5209885" y="0"/>
+                </a:cubicBezTo>
+                <a:cubicBezTo>
+                  <a:pt x="5657311" y="17220"/>
+                  <a:pt x="5692663" y="-3290"/>
+                  <a:pt x="6105335" y="0"/>
+                </a:cubicBezTo>
+                <a:cubicBezTo>
+                  <a:pt x="6518007" y="3290"/>
+                  <a:pt x="6455516" y="-5124"/>
+                  <a:pt x="6783705" y="0"/>
+                </a:cubicBezTo>
+                <a:cubicBezTo>
+                  <a:pt x="7111894" y="5124"/>
+                  <a:pt x="7441941" y="-17829"/>
+                  <a:pt x="7679154" y="0"/>
+                </a:cubicBezTo>
+                <a:cubicBezTo>
+                  <a:pt x="7916367" y="17829"/>
+                  <a:pt x="8102967" y="-24363"/>
+                  <a:pt x="8248985" y="0"/>
+                </a:cubicBezTo>
+                <a:cubicBezTo>
+                  <a:pt x="8395003" y="24363"/>
+                  <a:pt x="8552393" y="25505"/>
+                  <a:pt x="8818817" y="0"/>
+                </a:cubicBezTo>
+                <a:cubicBezTo>
+                  <a:pt x="9085241" y="-25505"/>
+                  <a:pt x="9411308" y="38000"/>
+                  <a:pt x="9605726" y="0"/>
+                </a:cubicBezTo>
+                <a:cubicBezTo>
+                  <a:pt x="9800144" y="-38000"/>
+                  <a:pt x="10006468" y="-25741"/>
+                  <a:pt x="10175558" y="0"/>
+                </a:cubicBezTo>
+                <a:cubicBezTo>
+                  <a:pt x="10344648" y="25741"/>
+                  <a:pt x="10696282" y="695"/>
+                  <a:pt x="10853928" y="0"/>
+                </a:cubicBezTo>
+                <a:cubicBezTo>
+                  <a:pt x="10853521" y="8690"/>
+                  <a:pt x="10853774" y="14141"/>
+                  <a:pt x="10853928" y="18288"/>
+                </a:cubicBezTo>
+                <a:cubicBezTo>
+                  <a:pt x="10608124" y="24255"/>
+                  <a:pt x="10343415" y="22307"/>
+                  <a:pt x="10067018" y="18288"/>
+                </a:cubicBezTo>
+                <a:cubicBezTo>
+                  <a:pt x="9790621" y="14270"/>
+                  <a:pt x="9843266" y="3564"/>
+                  <a:pt x="9714266" y="18288"/>
+                </a:cubicBezTo>
+                <a:cubicBezTo>
+                  <a:pt x="9585266" y="33012"/>
+                  <a:pt x="9379484" y="1875"/>
+                  <a:pt x="9252974" y="18288"/>
+                </a:cubicBezTo>
+                <a:cubicBezTo>
+                  <a:pt x="9126464" y="34701"/>
+                  <a:pt x="8580678" y="-4904"/>
+                  <a:pt x="8357525" y="18288"/>
+                </a:cubicBezTo>
+                <a:cubicBezTo>
+                  <a:pt x="8134372" y="41480"/>
+                  <a:pt x="7903199" y="26458"/>
+                  <a:pt x="7679154" y="18288"/>
+                </a:cubicBezTo>
+                <a:cubicBezTo>
+                  <a:pt x="7455109" y="10118"/>
+                  <a:pt x="7435944" y="27109"/>
+                  <a:pt x="7217862" y="18288"/>
+                </a:cubicBezTo>
+                <a:cubicBezTo>
+                  <a:pt x="6999780" y="9467"/>
+                  <a:pt x="6680409" y="18985"/>
+                  <a:pt x="6539492" y="18288"/>
+                </a:cubicBezTo>
+                <a:cubicBezTo>
+                  <a:pt x="6398575" y="17592"/>
+                  <a:pt x="6312077" y="33018"/>
+                  <a:pt x="6186739" y="18288"/>
+                </a:cubicBezTo>
+                <a:cubicBezTo>
+                  <a:pt x="6061401" y="3558"/>
+                  <a:pt x="5947033" y="12075"/>
+                  <a:pt x="5833986" y="18288"/>
+                </a:cubicBezTo>
+                <a:cubicBezTo>
+                  <a:pt x="5720939" y="24501"/>
+                  <a:pt x="5482226" y="8586"/>
+                  <a:pt x="5155616" y="18288"/>
+                </a:cubicBezTo>
+                <a:cubicBezTo>
+                  <a:pt x="4829006" y="27991"/>
+                  <a:pt x="4841274" y="29316"/>
+                  <a:pt x="4694324" y="18288"/>
+                </a:cubicBezTo>
+                <a:cubicBezTo>
+                  <a:pt x="4547374" y="7260"/>
+                  <a:pt x="4077675" y="7013"/>
+                  <a:pt x="3907414" y="18288"/>
+                </a:cubicBezTo>
+                <a:cubicBezTo>
+                  <a:pt x="3737153" y="29564"/>
+                  <a:pt x="3538393" y="21630"/>
+                  <a:pt x="3446122" y="18288"/>
+                </a:cubicBezTo>
+                <a:cubicBezTo>
+                  <a:pt x="3353851" y="14946"/>
+                  <a:pt x="2990320" y="-8091"/>
+                  <a:pt x="2659212" y="18288"/>
+                </a:cubicBezTo>
+                <a:cubicBezTo>
+                  <a:pt x="2328104" y="44667"/>
+                  <a:pt x="2427653" y="9607"/>
+                  <a:pt x="2306460" y="18288"/>
+                </a:cubicBezTo>
+                <a:cubicBezTo>
+                  <a:pt x="2185267" y="26969"/>
+                  <a:pt x="1719763" y="3717"/>
+                  <a:pt x="1519550" y="18288"/>
+                </a:cubicBezTo>
+                <a:cubicBezTo>
+                  <a:pt x="1319337" y="32860"/>
+                  <a:pt x="1167371" y="17040"/>
+                  <a:pt x="1058258" y="18288"/>
+                </a:cubicBezTo>
+                <a:cubicBezTo>
+                  <a:pt x="949145" y="19536"/>
+                  <a:pt x="780234" y="31447"/>
+                  <a:pt x="705505" y="18288"/>
+                </a:cubicBezTo>
+                <a:cubicBezTo>
+                  <a:pt x="630776" y="5129"/>
+                  <a:pt x="215796" y="30056"/>
+                  <a:pt x="0" y="18288"/>
+                </a:cubicBezTo>
+                <a:cubicBezTo>
+                  <a:pt x="-53" y="11301"/>
+                  <a:pt x="-649" y="7756"/>
+                  <a:pt x="0" y="0"/>
+                </a:cubicBezTo>
+                <a:close/>
+              </a:path>
+            </a:pathLst>
+          </a:custGeom>
+          <a:solidFill>
+            <a:schemeClr val="accent2"/>
+          </a:solidFill>
+          <a:ln w="41275" cap="rnd">
+            <a:solidFill>
+              <a:schemeClr val="accent2"/>
+            </a:solidFill>
+            <a:round/>
+            <a:extLst>
+              <a:ext uri="{C807C97D-BFC1-408E-A445-0C87EB9F89A2}">
+                <ask:lineSketchStyleProps xmlns:ask="http://schemas.microsoft.com/office/drawing/2018/sketchyshapes" sd="1219033472">
+                  <a:prstGeom prst="rect">
+                    <a:avLst/>
+                  </a:prstGeom>
+                  <ask:type>
+                    <ask:lineSketchFreehand/>
+                  </ask:type>
+                </ask:lineSketchStyleProps>
+              </a:ext>
+            </a:extLst>
+          </a:ln>
+        </p:spPr>
+        <p:style>
+          <a:lnRef idx="2">
+            <a:schemeClr val="accent1">
+              <a:shade val="50000"/>
+            </a:schemeClr>
+          </a:lnRef>
+          <a:fillRef idx="1">
+            <a:schemeClr val="accent1"/>
+          </a:fillRef>
+          <a:effectRef idx="0">
+            <a:schemeClr val="accent1"/>
+          </a:effectRef>
+          <a:fontRef idx="minor">
+            <a:schemeClr val="lt1"/>
+          </a:fontRef>
+        </p:style>
+        <p:txBody>
+          <a:bodyPr rtlCol="0" anchor="ctr"/>
+          <a:lstStyle/>
+          <a:p>
+            <a:pPr algn="ctr"/>
+            <a:endParaRPr lang="en-US"/>
+          </a:p>
+        </p:txBody>
+      </p:sp>
+      <p:sp>
+        <p:nvSpPr>
+          <p:cNvPr id="5" name="Content Placeholder 4">
+            <a:extLst>
+              <a:ext uri="{FF2B5EF4-FFF2-40B4-BE49-F238E27FC236}">
+                <a16:creationId xmlns:a16="http://schemas.microsoft.com/office/drawing/2014/main" id="{CD76F681-6E12-B473-B05C-BC47C85CA55E}"/>
+              </a:ext>
+            </a:extLst>
+          </p:cNvPr>
+          <p:cNvSpPr>
+            <a:spLocks noGrp="1"/>
+          </p:cNvSpPr>
+          <p:nvPr>
+            <p:ph idx="1"/>
+          </p:nvPr>
+        </p:nvSpPr>
+        <p:spPr>
+          <a:xfrm>
+            <a:off x="838200" y="1929384"/>
+            <a:ext cx="10684764" cy="4642866"/>
+          </a:xfrm>
+        </p:spPr>
+        <p:txBody>
+          <a:bodyPr>
+            <a:normAutofit lnSpcReduction="10000"/>
+          </a:bodyPr>
+          <a:lstStyle/>
+          <a:p>
+            <a:pPr marL="0" indent="0">
+              <a:buNone/>
+            </a:pPr>
+            <a:r>
+              <a:rPr lang="en-US" sz="2400" dirty="0">
+                <a:effectLst/>
+                <a:latin typeface="Calibri" panose="020F0502020204030204" pitchFamily="34" charset="0"/>
+                <a:ea typeface="Calibri" panose="020F0502020204030204" pitchFamily="34" charset="0"/>
+                <a:cs typeface="Times New Roman" panose="02020603050405020304" pitchFamily="18" charset="0"/>
+              </a:rPr>
+              <a:t>We are modeling a </a:t>
+            </a:r>
+            <a:r>
+              <a:rPr lang="en-US" sz="2400" dirty="0">
+                <a:effectLst/>
+                <a:highlight>
+                  <a:srgbClr val="FFFF00"/>
+                </a:highlight>
+                <a:latin typeface="Calibri" panose="020F0502020204030204" pitchFamily="34" charset="0"/>
+                <a:ea typeface="Calibri" panose="020F0502020204030204" pitchFamily="34" charset="0"/>
+                <a:cs typeface="Times New Roman" panose="02020603050405020304" pitchFamily="18" charset="0"/>
+              </a:rPr>
+              <a:t>temperature controller</a:t>
+            </a:r>
+            <a:r>
+              <a:rPr lang="en-US" sz="2400" dirty="0">
+                <a:effectLst/>
+                <a:latin typeface="Calibri" panose="020F0502020204030204" pitchFamily="34" charset="0"/>
+                <a:ea typeface="Calibri" panose="020F0502020204030204" pitchFamily="34" charset="0"/>
+                <a:cs typeface="Times New Roman" panose="02020603050405020304" pitchFamily="18" charset="0"/>
+              </a:rPr>
+              <a:t>. The controller's purpose is </a:t>
+            </a:r>
+            <a:r>
+              <a:rPr lang="en-US" sz="2400" dirty="0">
+                <a:effectLst/>
+                <a:highlight>
+                  <a:srgbClr val="FFFF00"/>
+                </a:highlight>
+                <a:latin typeface="Calibri" panose="020F0502020204030204" pitchFamily="34" charset="0"/>
+                <a:ea typeface="Calibri" panose="020F0502020204030204" pitchFamily="34" charset="0"/>
+                <a:cs typeface="Times New Roman" panose="02020603050405020304" pitchFamily="18" charset="0"/>
+              </a:rPr>
+              <a:t>to have the temperature of a room controlled</a:t>
+            </a:r>
+            <a:r>
+              <a:rPr lang="en-US" sz="2400" dirty="0">
+                <a:effectLst/>
+                <a:latin typeface="Calibri" panose="020F0502020204030204" pitchFamily="34" charset="0"/>
+                <a:ea typeface="Calibri" panose="020F0502020204030204" pitchFamily="34" charset="0"/>
+                <a:cs typeface="Times New Roman" panose="02020603050405020304" pitchFamily="18" charset="0"/>
+              </a:rPr>
+              <a:t> at all times. To do so, it sends periodic signals that turn on or off the heater. Specifically, the controller may choose to </a:t>
+            </a:r>
+            <a:r>
+              <a:rPr lang="en-US" sz="2400" dirty="0">
+                <a:effectLst/>
+                <a:highlight>
+                  <a:srgbClr val="FFFF00"/>
+                </a:highlight>
+                <a:latin typeface="Calibri" panose="020F0502020204030204" pitchFamily="34" charset="0"/>
+                <a:ea typeface="Calibri" panose="020F0502020204030204" pitchFamily="34" charset="0"/>
+                <a:cs typeface="Times New Roman" panose="02020603050405020304" pitchFamily="18" charset="0"/>
+              </a:rPr>
+              <a:t>send an on signal</a:t>
+            </a:r>
+            <a:r>
+              <a:rPr lang="en-US" sz="2400" dirty="0">
+                <a:effectLst/>
+                <a:latin typeface="Calibri" panose="020F0502020204030204" pitchFamily="34" charset="0"/>
+                <a:ea typeface="Calibri" panose="020F0502020204030204" pitchFamily="34" charset="0"/>
+                <a:cs typeface="Times New Roman" panose="02020603050405020304" pitchFamily="18" charset="0"/>
+              </a:rPr>
+              <a:t> or to </a:t>
+            </a:r>
+            <a:r>
+              <a:rPr lang="en-US" sz="2400" dirty="0">
+                <a:effectLst/>
+                <a:highlight>
+                  <a:srgbClr val="FFFF00"/>
+                </a:highlight>
+                <a:latin typeface="Calibri" panose="020F0502020204030204" pitchFamily="34" charset="0"/>
+                <a:ea typeface="Calibri" panose="020F0502020204030204" pitchFamily="34" charset="0"/>
+                <a:cs typeface="Times New Roman" panose="02020603050405020304" pitchFamily="18" charset="0"/>
+              </a:rPr>
+              <a:t>send an off signal</a:t>
+            </a:r>
+            <a:r>
+              <a:rPr lang="en-US" sz="2400" dirty="0">
+                <a:effectLst/>
+                <a:latin typeface="Calibri" panose="020F0502020204030204" pitchFamily="34" charset="0"/>
+                <a:ea typeface="Calibri" panose="020F0502020204030204" pitchFamily="34" charset="0"/>
+                <a:cs typeface="Times New Roman" panose="02020603050405020304" pitchFamily="18" charset="0"/>
+              </a:rPr>
+              <a:t> to the heater. These signals are sent wirelessly to the heater, so they are not always received. Thus, when an on signal is sent the outcome can be that the </a:t>
+            </a:r>
+            <a:r>
+              <a:rPr lang="en-US" sz="2400" dirty="0">
+                <a:effectLst/>
+                <a:highlight>
+                  <a:srgbClr val="FFFF00"/>
+                </a:highlight>
+                <a:latin typeface="Calibri" panose="020F0502020204030204" pitchFamily="34" charset="0"/>
+                <a:ea typeface="Calibri" panose="020F0502020204030204" pitchFamily="34" charset="0"/>
+                <a:cs typeface="Times New Roman" panose="02020603050405020304" pitchFamily="18" charset="0"/>
+              </a:rPr>
+              <a:t>on-signal succeeded</a:t>
+            </a:r>
+            <a:r>
+              <a:rPr lang="en-US" sz="2400" dirty="0">
+                <a:effectLst/>
+                <a:latin typeface="Calibri" panose="020F0502020204030204" pitchFamily="34" charset="0"/>
+                <a:ea typeface="Calibri" panose="020F0502020204030204" pitchFamily="34" charset="0"/>
+                <a:cs typeface="Times New Roman" panose="02020603050405020304" pitchFamily="18" charset="0"/>
+              </a:rPr>
+              <a:t> or that the </a:t>
+            </a:r>
+            <a:r>
+              <a:rPr lang="en-US" sz="2400" dirty="0">
+                <a:effectLst/>
+                <a:highlight>
+                  <a:srgbClr val="FFFF00"/>
+                </a:highlight>
+                <a:latin typeface="Calibri" panose="020F0502020204030204" pitchFamily="34" charset="0"/>
+                <a:ea typeface="Calibri" panose="020F0502020204030204" pitchFamily="34" charset="0"/>
+                <a:cs typeface="Times New Roman" panose="02020603050405020304" pitchFamily="18" charset="0"/>
+              </a:rPr>
+              <a:t>on-signal failed</a:t>
+            </a:r>
+            <a:r>
+              <a:rPr lang="en-US" sz="2400" dirty="0">
+                <a:effectLst/>
+                <a:latin typeface="Calibri" panose="020F0502020204030204" pitchFamily="34" charset="0"/>
+                <a:ea typeface="Calibri" panose="020F0502020204030204" pitchFamily="34" charset="0"/>
+                <a:cs typeface="Times New Roman" panose="02020603050405020304" pitchFamily="18" charset="0"/>
+              </a:rPr>
+              <a:t>. Likewise, the outcome of an off signal can be </a:t>
+            </a:r>
+            <a:r>
+              <a:rPr lang="en-US" sz="2400" dirty="0">
+                <a:effectLst/>
+                <a:highlight>
+                  <a:srgbClr val="FFFF00"/>
+                </a:highlight>
+                <a:latin typeface="Calibri" panose="020F0502020204030204" pitchFamily="34" charset="0"/>
+                <a:ea typeface="Calibri" panose="020F0502020204030204" pitchFamily="34" charset="0"/>
+                <a:cs typeface="Times New Roman" panose="02020603050405020304" pitchFamily="18" charset="0"/>
+              </a:rPr>
+              <a:t>off-signal succeeded</a:t>
+            </a:r>
+            <a:r>
+              <a:rPr lang="en-US" sz="2400" dirty="0">
+                <a:effectLst/>
+                <a:latin typeface="Calibri" panose="020F0502020204030204" pitchFamily="34" charset="0"/>
+                <a:ea typeface="Calibri" panose="020F0502020204030204" pitchFamily="34" charset="0"/>
+                <a:cs typeface="Times New Roman" panose="02020603050405020304" pitchFamily="18" charset="0"/>
+              </a:rPr>
+              <a:t> or </a:t>
+            </a:r>
+            <a:r>
+              <a:rPr lang="en-US" sz="2400" dirty="0">
+                <a:effectLst/>
+                <a:highlight>
+                  <a:srgbClr val="FFFF00"/>
+                </a:highlight>
+                <a:latin typeface="Calibri" panose="020F0502020204030204" pitchFamily="34" charset="0"/>
+                <a:ea typeface="Calibri" panose="020F0502020204030204" pitchFamily="34" charset="0"/>
+                <a:cs typeface="Times New Roman" panose="02020603050405020304" pitchFamily="18" charset="0"/>
+              </a:rPr>
+              <a:t>off-signal failed</a:t>
+            </a:r>
+            <a:r>
+              <a:rPr lang="en-US" sz="2400" dirty="0">
+                <a:effectLst/>
+                <a:latin typeface="Calibri" panose="020F0502020204030204" pitchFamily="34" charset="0"/>
+                <a:ea typeface="Calibri" panose="020F0502020204030204" pitchFamily="34" charset="0"/>
+                <a:cs typeface="Times New Roman" panose="02020603050405020304" pitchFamily="18" charset="0"/>
+              </a:rPr>
+              <a:t>. Whether that </a:t>
+            </a:r>
+            <a:r>
+              <a:rPr lang="en-US" sz="2400" dirty="0">
+                <a:effectLst/>
+                <a:highlight>
+                  <a:srgbClr val="FFFF00"/>
+                </a:highlight>
+                <a:latin typeface="Calibri" panose="020F0502020204030204" pitchFamily="34" charset="0"/>
+                <a:ea typeface="Calibri" panose="020F0502020204030204" pitchFamily="34" charset="0"/>
+                <a:cs typeface="Times New Roman" panose="02020603050405020304" pitchFamily="18" charset="0"/>
+              </a:rPr>
+              <a:t>heater is on</a:t>
+            </a:r>
+            <a:r>
+              <a:rPr lang="en-US" sz="2400" dirty="0">
+                <a:effectLst/>
+                <a:latin typeface="Calibri" panose="020F0502020204030204" pitchFamily="34" charset="0"/>
+                <a:ea typeface="Calibri" panose="020F0502020204030204" pitchFamily="34" charset="0"/>
+                <a:cs typeface="Times New Roman" panose="02020603050405020304" pitchFamily="18" charset="0"/>
+              </a:rPr>
+              <a:t> is eventually true depends on which of those four outcomes comes about as well as whether the </a:t>
+            </a:r>
+            <a:r>
+              <a:rPr lang="en-US" sz="2400" dirty="0">
+                <a:effectLst/>
+                <a:highlight>
+                  <a:srgbClr val="FFFF00"/>
+                </a:highlight>
+                <a:latin typeface="Calibri" panose="020F0502020204030204" pitchFamily="34" charset="0"/>
+                <a:ea typeface="Calibri" panose="020F0502020204030204" pitchFamily="34" charset="0"/>
+                <a:cs typeface="Times New Roman" panose="02020603050405020304" pitchFamily="18" charset="0"/>
+              </a:rPr>
+              <a:t>heater was previously on</a:t>
+            </a:r>
+            <a:r>
+              <a:rPr lang="en-US" sz="2400" dirty="0">
+                <a:effectLst/>
+                <a:latin typeface="Calibri" panose="020F0502020204030204" pitchFamily="34" charset="0"/>
+                <a:ea typeface="Calibri" panose="020F0502020204030204" pitchFamily="34" charset="0"/>
+                <a:cs typeface="Times New Roman" panose="02020603050405020304" pitchFamily="18" charset="0"/>
+              </a:rPr>
+              <a:t>. The temperature controller sends on and off signals aimed at satisfying some high-level objectives of the occupants of the room. One is to </a:t>
+            </a:r>
+            <a:r>
+              <a:rPr lang="en-US" sz="2400" dirty="0">
+                <a:effectLst/>
+                <a:highlight>
+                  <a:srgbClr val="FFFF00"/>
+                </a:highlight>
+                <a:latin typeface="Calibri" panose="020F0502020204030204" pitchFamily="34" charset="0"/>
+                <a:ea typeface="Calibri" panose="020F0502020204030204" pitchFamily="34" charset="0"/>
+                <a:cs typeface="Times New Roman" panose="02020603050405020304" pitchFamily="18" charset="0"/>
+              </a:rPr>
+              <a:t>maximize comfort</a:t>
+            </a:r>
+            <a:r>
+              <a:rPr lang="en-US" sz="2400" dirty="0">
+                <a:effectLst/>
+                <a:latin typeface="Calibri" panose="020F0502020204030204" pitchFamily="34" charset="0"/>
+                <a:ea typeface="Calibri" panose="020F0502020204030204" pitchFamily="34" charset="0"/>
+                <a:cs typeface="Times New Roman" panose="02020603050405020304" pitchFamily="18" charset="0"/>
+              </a:rPr>
+              <a:t> via </a:t>
+            </a:r>
+            <a:r>
+              <a:rPr lang="en-US" sz="2400" dirty="0">
+                <a:effectLst/>
+                <a:highlight>
+                  <a:srgbClr val="FFFF00"/>
+                </a:highlight>
+                <a:latin typeface="Calibri" panose="020F0502020204030204" pitchFamily="34" charset="0"/>
+                <a:ea typeface="Calibri" panose="020F0502020204030204" pitchFamily="34" charset="0"/>
+                <a:cs typeface="Times New Roman" panose="02020603050405020304" pitchFamily="18" charset="0"/>
+              </a:rPr>
+              <a:t>maintaining the ideal temperature</a:t>
+            </a:r>
+            <a:r>
+              <a:rPr lang="en-US" sz="2400" dirty="0">
+                <a:effectLst/>
+                <a:latin typeface="Calibri" panose="020F0502020204030204" pitchFamily="34" charset="0"/>
+                <a:ea typeface="Calibri" panose="020F0502020204030204" pitchFamily="34" charset="0"/>
+                <a:cs typeface="Times New Roman" panose="02020603050405020304" pitchFamily="18" charset="0"/>
+              </a:rPr>
+              <a:t> in the room. Maintaining the ideal temperature depends on whether the </a:t>
+            </a:r>
+            <a:r>
+              <a:rPr lang="en-US" sz="2400" dirty="0">
+                <a:effectLst/>
+                <a:highlight>
+                  <a:srgbClr val="FFFF00"/>
+                </a:highlight>
+                <a:latin typeface="Calibri" panose="020F0502020204030204" pitchFamily="34" charset="0"/>
+                <a:ea typeface="Calibri" panose="020F0502020204030204" pitchFamily="34" charset="0"/>
+                <a:cs typeface="Times New Roman" panose="02020603050405020304" pitchFamily="18" charset="0"/>
+              </a:rPr>
+              <a:t>ideal temperature was maintained in the previous stage</a:t>
+            </a:r>
+            <a:r>
+              <a:rPr lang="en-US" sz="2400" dirty="0">
+                <a:effectLst/>
+                <a:latin typeface="Calibri" panose="020F0502020204030204" pitchFamily="34" charset="0"/>
+                <a:ea typeface="Calibri" panose="020F0502020204030204" pitchFamily="34" charset="0"/>
+                <a:cs typeface="Times New Roman" panose="02020603050405020304" pitchFamily="18" charset="0"/>
+              </a:rPr>
+              <a:t> and the heater was on or off meanwhile. At the same time the controller wants to ensure that the heater does not stay unnecessarily on for a long period of time. It does that aimed at </a:t>
+            </a:r>
+            <a:r>
+              <a:rPr lang="en-US" sz="2400" dirty="0">
+                <a:effectLst/>
+                <a:highlight>
+                  <a:srgbClr val="FFFF00"/>
+                </a:highlight>
+                <a:latin typeface="Calibri" panose="020F0502020204030204" pitchFamily="34" charset="0"/>
+                <a:ea typeface="Calibri" panose="020F0502020204030204" pitchFamily="34" charset="0"/>
+                <a:cs typeface="Times New Roman" panose="02020603050405020304" pitchFamily="18" charset="0"/>
+              </a:rPr>
+              <a:t>minimizing cost</a:t>
+            </a:r>
+            <a:r>
+              <a:rPr lang="en-US" sz="2400" dirty="0">
+                <a:effectLst/>
+                <a:latin typeface="Calibri" panose="020F0502020204030204" pitchFamily="34" charset="0"/>
+                <a:ea typeface="Calibri" panose="020F0502020204030204" pitchFamily="34" charset="0"/>
+                <a:cs typeface="Times New Roman" panose="02020603050405020304" pitchFamily="18" charset="0"/>
+              </a:rPr>
+              <a:t>. </a:t>
+            </a:r>
+            <a:endParaRPr lang="en-CA" sz="2400" dirty="0">
+              <a:effectLst/>
+              <a:latin typeface="Calibri" panose="020F0502020204030204" pitchFamily="34" charset="0"/>
+              <a:ea typeface="Calibri" panose="020F0502020204030204" pitchFamily="34" charset="0"/>
+              <a:cs typeface="Times New Roman" panose="02020603050405020304" pitchFamily="18" charset="0"/>
+            </a:endParaRPr>
+          </a:p>
+        </p:txBody>
+      </p:sp>
+    </p:spTree>
+    <p:extLst>
+      <p:ext uri="{BB962C8B-B14F-4D97-AF65-F5344CB8AC3E}">
+        <p14:creationId xmlns:p14="http://schemas.microsoft.com/office/powerpoint/2010/main" val="2998996539"/>
       </p:ext>
     </p:extLst>
   </p:cSld>

</xml_diff>